<commit_message>
updata sprint1 burndown chart
</commit_message>
<xml_diff>
--- a/document/Sprint 1 Burndown charts/Sprint Burndown Charts.pptx
+++ b/document/Sprint 1 Burndown charts/Sprint Burndown Charts.pptx
@@ -106,7 +106,33 @@
       </a:defRPr>
     </a:lvl9pPr>
   </p:defaultTextStyle>
+  <p:extLst>
+    <p:ext uri="{EFAFB233-063F-42B5-8137-9DF3F51BA10A}">
+      <p15:sldGuideLst xmlns:p15="http://schemas.microsoft.com/office/powerpoint/2012/main"/>
+    </p:ext>
+  </p:extLst>
 </p:presentation>
+</file>
+
+<file path=ppt/changesInfos/changesInfo1.xml><?xml version="1.0" encoding="utf-8"?>
+<pc:chgInfo xmlns:a="http://schemas.openxmlformats.org/drawingml/2006/main" xmlns:r="http://schemas.openxmlformats.org/officeDocument/2006/relationships" xmlns:ac="http://schemas.microsoft.com/office/drawing/2013/main/command" xmlns:pc="http://schemas.microsoft.com/office/powerpoint/2013/main/command">
+  <pc:docChgLst>
+    <pc:chgData name="Zhang Boyi" userId="0fab39d1ed880c2d" providerId="LiveId" clId="{C85B2FDE-1290-4112-A684-B6C6003D60EE}"/>
+    <pc:docChg chg="modSld">
+      <pc:chgData name="Zhang Boyi" userId="0fab39d1ed880c2d" providerId="LiveId" clId="{C85B2FDE-1290-4112-A684-B6C6003D60EE}" dt="2023-05-02T01:46:44.801" v="19" actId="27918"/>
+      <pc:docMkLst>
+        <pc:docMk/>
+      </pc:docMkLst>
+      <pc:sldChg chg="mod">
+        <pc:chgData name="Zhang Boyi" userId="0fab39d1ed880c2d" providerId="LiveId" clId="{C85B2FDE-1290-4112-A684-B6C6003D60EE}" dt="2023-05-02T01:46:44.801" v="19" actId="27918"/>
+        <pc:sldMkLst>
+          <pc:docMk/>
+          <pc:sldMk cId="3984536260" sldId="258"/>
+        </pc:sldMkLst>
+      </pc:sldChg>
+    </pc:docChg>
+  </pc:docChgLst>
+</pc:chgInfo>
 </file>
 
 <file path=ppt/charts/chart1.xml><?xml version="1.0" encoding="utf-8"?>
@@ -659,6 +685,11 @@
               </a:ln>
               <a:effectLst/>
             </c:spPr>
+            <c:extLst>
+              <c:ext xmlns:c16="http://schemas.microsoft.com/office/drawing/2014/chart" uri="{C3380CC4-5D6E-409C-BE32-E72D297353CC}">
+                <c16:uniqueId val="{00000001-B860-4BAE-BBCD-A103CF1638FF}"/>
+              </c:ext>
+            </c:extLst>
           </c:dPt>
           <c:dPt>
             <c:idx val="1"/>
@@ -674,6 +705,11 @@
               </a:ln>
               <a:effectLst/>
             </c:spPr>
+            <c:extLst>
+              <c:ext xmlns:c16="http://schemas.microsoft.com/office/drawing/2014/chart" uri="{C3380CC4-5D6E-409C-BE32-E72D297353CC}">
+                <c16:uniqueId val="{00000003-B860-4BAE-BBCD-A103CF1638FF}"/>
+              </c:ext>
+            </c:extLst>
           </c:dPt>
           <c:cat>
             <c:strRef>
@@ -904,6 +940,99 @@
           <c:extLst>
             <c:ext xmlns:c16="http://schemas.microsoft.com/office/drawing/2014/chart" uri="{C3380CC4-5D6E-409C-BE32-E72D297353CC}">
               <c16:uniqueId val="{00000000-A400-4A04-A552-7726A42F9C14}"/>
+            </c:ext>
+          </c:extLst>
+        </c:ser>
+        <c:ser>
+          <c:idx val="1"/>
+          <c:order val="1"/>
+          <c:tx>
+            <c:strRef>
+              <c:f>Sheet1!$C$1</c:f>
+              <c:strCache>
+                <c:ptCount val="1"/>
+                <c:pt idx="0">
+                  <c:v>Plan</c:v>
+                </c:pt>
+              </c:strCache>
+            </c:strRef>
+          </c:tx>
+          <c:spPr>
+            <a:ln w="28575" cap="rnd">
+              <a:solidFill>
+                <a:schemeClr val="accent2"/>
+              </a:solidFill>
+              <a:round/>
+            </a:ln>
+            <a:effectLst/>
+          </c:spPr>
+          <c:marker>
+            <c:symbol val="none"/>
+          </c:marker>
+          <c:cat>
+            <c:numRef>
+              <c:f>Sheet1!$A$2:$A$8</c:f>
+              <c:numCache>
+                <c:formatCode>d\-mmm</c:formatCode>
+                <c:ptCount val="7"/>
+                <c:pt idx="0">
+                  <c:v>44949</c:v>
+                </c:pt>
+                <c:pt idx="1">
+                  <c:v>44956</c:v>
+                </c:pt>
+                <c:pt idx="2">
+                  <c:v>44969</c:v>
+                </c:pt>
+                <c:pt idx="3">
+                  <c:v>44976</c:v>
+                </c:pt>
+                <c:pt idx="4">
+                  <c:v>44983</c:v>
+                </c:pt>
+                <c:pt idx="5">
+                  <c:v>44987</c:v>
+                </c:pt>
+                <c:pt idx="6">
+                  <c:v>44994</c:v>
+                </c:pt>
+              </c:numCache>
+            </c:numRef>
+          </c:cat>
+          <c:val>
+            <c:numRef>
+              <c:f>Sheet1!$C$2:$C$8</c:f>
+              <c:numCache>
+                <c:formatCode>General</c:formatCode>
+                <c:ptCount val="7"/>
+                <c:pt idx="0">
+                  <c:v>0</c:v>
+                </c:pt>
+                <c:pt idx="1">
+                  <c:v>0</c:v>
+                </c:pt>
+                <c:pt idx="2">
+                  <c:v>-2</c:v>
+                </c:pt>
+                <c:pt idx="3">
+                  <c:v>0</c:v>
+                </c:pt>
+                <c:pt idx="4">
+                  <c:v>-1</c:v>
+                </c:pt>
+                <c:pt idx="5">
+                  <c:v>-2</c:v>
+                </c:pt>
+                <c:pt idx="6">
+                  <c:v>-5</c:v>
+                </c:pt>
+              </c:numCache>
+            </c:numRef>
+          </c:val>
+          <c:smooth val="0"/>
+          <c:extLst>
+            <c:ext xmlns:c16="http://schemas.microsoft.com/office/drawing/2014/chart" uri="{C3380CC4-5D6E-409C-BE32-E72D297353CC}">
+              <c16:uniqueId val="{00000001-B777-49EF-872C-4AA138B247D2}"/>
             </c:ext>
           </c:extLst>
         </c:ser>
@@ -3501,7 +3630,7 @@
           <a:p>
             <a:fld id="{77F306D5-E0B1-4196-A0E3-D1BE428AB64E}" type="datetimeFigureOut">
               <a:rPr lang="zh-CN" altLang="en-US" smtClean="0"/>
-              <a:t>2023/3/7</a:t>
+              <a:t>2023/5/1</a:t>
             </a:fld>
             <a:endParaRPr lang="zh-CN" altLang="en-US"/>
           </a:p>
@@ -3752,7 +3881,7 @@
           <a:p>
             <a:fld id="{77F306D5-E0B1-4196-A0E3-D1BE428AB64E}" type="datetimeFigureOut">
               <a:rPr lang="zh-CN" altLang="en-US" smtClean="0"/>
-              <a:t>2023/3/7</a:t>
+              <a:t>2023/5/1</a:t>
             </a:fld>
             <a:endParaRPr lang="zh-CN" altLang="en-US"/>
           </a:p>
@@ -4066,7 +4195,7 @@
           <a:p>
             <a:fld id="{77F306D5-E0B1-4196-A0E3-D1BE428AB64E}" type="datetimeFigureOut">
               <a:rPr lang="zh-CN" altLang="en-US" smtClean="0"/>
-              <a:t>2023/3/7</a:t>
+              <a:t>2023/5/1</a:t>
             </a:fld>
             <a:endParaRPr lang="zh-CN" altLang="en-US"/>
           </a:p>
@@ -4399,7 +4528,7 @@
           <a:p>
             <a:fld id="{77F306D5-E0B1-4196-A0E3-D1BE428AB64E}" type="datetimeFigureOut">
               <a:rPr lang="zh-CN" altLang="en-US" smtClean="0"/>
-              <a:t>2023/3/7</a:t>
+              <a:t>2023/5/1</a:t>
             </a:fld>
             <a:endParaRPr lang="zh-CN" altLang="en-US"/>
           </a:p>
@@ -4713,7 +4842,7 @@
           <a:p>
             <a:fld id="{77F306D5-E0B1-4196-A0E3-D1BE428AB64E}" type="datetimeFigureOut">
               <a:rPr lang="zh-CN" altLang="en-US" smtClean="0"/>
-              <a:t>2023/3/7</a:t>
+              <a:t>2023/5/1</a:t>
             </a:fld>
             <a:endParaRPr lang="zh-CN" altLang="en-US"/>
           </a:p>
@@ -5106,7 +5235,7 @@
           <a:p>
             <a:fld id="{77F306D5-E0B1-4196-A0E3-D1BE428AB64E}" type="datetimeFigureOut">
               <a:rPr lang="zh-CN" altLang="en-US" smtClean="0"/>
-              <a:t>2023/3/7</a:t>
+              <a:t>2023/5/1</a:t>
             </a:fld>
             <a:endParaRPr lang="zh-CN" altLang="en-US"/>
           </a:p>
@@ -5276,7 +5405,7 @@
           <a:p>
             <a:fld id="{77F306D5-E0B1-4196-A0E3-D1BE428AB64E}" type="datetimeFigureOut">
               <a:rPr lang="zh-CN" altLang="en-US" smtClean="0"/>
-              <a:t>2023/3/7</a:t>
+              <a:t>2023/5/1</a:t>
             </a:fld>
             <a:endParaRPr lang="zh-CN" altLang="en-US"/>
           </a:p>
@@ -5456,7 +5585,7 @@
           <a:p>
             <a:fld id="{77F306D5-E0B1-4196-A0E3-D1BE428AB64E}" type="datetimeFigureOut">
               <a:rPr lang="zh-CN" altLang="en-US" smtClean="0"/>
-              <a:t>2023/3/7</a:t>
+              <a:t>2023/5/1</a:t>
             </a:fld>
             <a:endParaRPr lang="zh-CN" altLang="en-US"/>
           </a:p>
@@ -5626,7 +5755,7 @@
           <a:p>
             <a:fld id="{77F306D5-E0B1-4196-A0E3-D1BE428AB64E}" type="datetimeFigureOut">
               <a:rPr lang="zh-CN" altLang="en-US" smtClean="0"/>
-              <a:t>2023/3/7</a:t>
+              <a:t>2023/5/1</a:t>
             </a:fld>
             <a:endParaRPr lang="zh-CN" altLang="en-US"/>
           </a:p>
@@ -5873,7 +6002,7 @@
           <a:p>
             <a:fld id="{77F306D5-E0B1-4196-A0E3-D1BE428AB64E}" type="datetimeFigureOut">
               <a:rPr lang="zh-CN" altLang="en-US" smtClean="0"/>
-              <a:t>2023/3/7</a:t>
+              <a:t>2023/5/1</a:t>
             </a:fld>
             <a:endParaRPr lang="zh-CN" altLang="en-US"/>
           </a:p>
@@ -6105,7 +6234,7 @@
           <a:p>
             <a:fld id="{77F306D5-E0B1-4196-A0E3-D1BE428AB64E}" type="datetimeFigureOut">
               <a:rPr lang="zh-CN" altLang="en-US" smtClean="0"/>
-              <a:t>2023/3/7</a:t>
+              <a:t>2023/5/1</a:t>
             </a:fld>
             <a:endParaRPr lang="zh-CN" altLang="en-US"/>
           </a:p>
@@ -6479,7 +6608,7 @@
           <a:p>
             <a:fld id="{77F306D5-E0B1-4196-A0E3-D1BE428AB64E}" type="datetimeFigureOut">
               <a:rPr lang="zh-CN" altLang="en-US" smtClean="0"/>
-              <a:t>2023/3/7</a:t>
+              <a:t>2023/5/1</a:t>
             </a:fld>
             <a:endParaRPr lang="zh-CN" altLang="en-US"/>
           </a:p>
@@ -6602,7 +6731,7 @@
           <a:p>
             <a:fld id="{77F306D5-E0B1-4196-A0E3-D1BE428AB64E}" type="datetimeFigureOut">
               <a:rPr lang="zh-CN" altLang="en-US" smtClean="0"/>
-              <a:t>2023/3/7</a:t>
+              <a:t>2023/5/1</a:t>
             </a:fld>
             <a:endParaRPr lang="zh-CN" altLang="en-US"/>
           </a:p>
@@ -6697,7 +6826,7 @@
           <a:p>
             <a:fld id="{77F306D5-E0B1-4196-A0E3-D1BE428AB64E}" type="datetimeFigureOut">
               <a:rPr lang="zh-CN" altLang="en-US" smtClean="0"/>
-              <a:t>2023/3/7</a:t>
+              <a:t>2023/5/1</a:t>
             </a:fld>
             <a:endParaRPr lang="zh-CN" altLang="en-US"/>
           </a:p>
@@ -6952,7 +7081,7 @@
           <a:p>
             <a:fld id="{77F306D5-E0B1-4196-A0E3-D1BE428AB64E}" type="datetimeFigureOut">
               <a:rPr lang="zh-CN" altLang="en-US" smtClean="0"/>
-              <a:t>2023/3/7</a:t>
+              <a:t>2023/5/1</a:t>
             </a:fld>
             <a:endParaRPr lang="zh-CN" altLang="en-US"/>
           </a:p>
@@ -7257,7 +7386,7 @@
           <a:p>
             <a:fld id="{77F306D5-E0B1-4196-A0E3-D1BE428AB64E}" type="datetimeFigureOut">
               <a:rPr lang="zh-CN" altLang="en-US" smtClean="0"/>
-              <a:t>2023/3/7</a:t>
+              <a:t>2023/5/1</a:t>
             </a:fld>
             <a:endParaRPr lang="zh-CN" altLang="en-US"/>
           </a:p>
@@ -7959,7 +8088,7 @@
           <a:p>
             <a:fld id="{77F306D5-E0B1-4196-A0E3-D1BE428AB64E}" type="datetimeFigureOut">
               <a:rPr lang="zh-CN" altLang="en-US" smtClean="0"/>
-              <a:t>2023/3/7</a:t>
+              <a:t>2023/5/1</a:t>
             </a:fld>
             <a:endParaRPr lang="zh-CN" altLang="en-US"/>
           </a:p>
@@ -8700,7 +8829,7 @@
             <p:ph idx="1"/>
             <p:extLst>
               <p:ext uri="{D42A27DB-BD31-4B8C-83A1-F6EECF244321}">
-                <p14:modId xmlns:p14="http://schemas.microsoft.com/office/powerpoint/2010/main" val="2105255010"/>
+                <p14:modId xmlns:p14="http://schemas.microsoft.com/office/powerpoint/2010/main" val="326347483"/>
               </p:ext>
             </p:extLst>
           </p:nvPr>

</xml_diff>